<commit_message>
Update Learn slides for Live360 Orlando 2025
</commit_message>
<xml_diff>
--- a/2025/1116_VSLiveOrlando/Contributing to Learn/VSLive Orlando 25 - Become a MS Learn Contributor_AlvinAshcraft.pptx
+++ b/2025/1116_VSLiveOrlando/Contributing to Learn/VSLive Orlando 25 - Become a MS Learn Contributor_AlvinAshcraft.pptx
@@ -432,7 +432,7 @@
               <a:pPr>
                 <a:defRPr/>
               </a:pPr>
-              <a:t>10/11/2025</a:t>
+              <a:t>11/15/2025</a:t>
             </a:fld>
             <a:endParaRPr lang="en-US"/>
           </a:p>
@@ -5652,7 +5652,7 @@
               <a:pPr>
                 <a:defRPr/>
               </a:pPr>
-              <a:t>10/11/2025</a:t>
+              <a:t>11/15/2025</a:t>
             </a:fld>
             <a:endParaRPr lang="en-US"/>
           </a:p>
@@ -5809,7 +5809,7 @@
               <a:pPr>
                 <a:defRPr/>
               </a:pPr>
-              <a:t>10/11/2025</a:t>
+              <a:t>11/15/2025</a:t>
             </a:fld>
             <a:endParaRPr lang="en-US"/>
           </a:p>
@@ -5976,7 +5976,7 @@
               <a:pPr>
                 <a:defRPr/>
               </a:pPr>
-              <a:t>10/11/2025</a:t>
+              <a:t>11/15/2025</a:t>
             </a:fld>
             <a:endParaRPr lang="en-US"/>
           </a:p>
@@ -6206,7 +6206,7 @@
               <a:pPr>
                 <a:defRPr/>
               </a:pPr>
-              <a:t>10/11/2025</a:t>
+              <a:t>11/15/2025</a:t>
             </a:fld>
             <a:endParaRPr lang="en-US"/>
           </a:p>
@@ -6373,7 +6373,7 @@
               <a:pPr>
                 <a:defRPr/>
               </a:pPr>
-              <a:t>10/11/2025</a:t>
+              <a:t>11/15/2025</a:t>
             </a:fld>
             <a:endParaRPr lang="en-US" dirty="0"/>
           </a:p>
@@ -6607,7 +6607,7 @@
               <a:pPr>
                 <a:defRPr/>
               </a:pPr>
-              <a:t>10/11/2025</a:t>
+              <a:t>11/15/2025</a:t>
             </a:fld>
             <a:endParaRPr lang="en-US"/>
           </a:p>
@@ -6881,7 +6881,7 @@
               <a:pPr>
                 <a:defRPr/>
               </a:pPr>
-              <a:t>10/11/2025</a:t>
+              <a:t>11/15/2025</a:t>
             </a:fld>
             <a:endParaRPr lang="en-US"/>
           </a:p>
@@ -7294,7 +7294,7 @@
               <a:pPr>
                 <a:defRPr/>
               </a:pPr>
-              <a:t>10/11/2025</a:t>
+              <a:t>11/15/2025</a:t>
             </a:fld>
             <a:endParaRPr lang="en-US"/>
           </a:p>
@@ -7400,7 +7400,7 @@
               <a:pPr>
                 <a:defRPr/>
               </a:pPr>
-              <a:t>10/11/2025</a:t>
+              <a:t>11/15/2025</a:t>
             </a:fld>
             <a:endParaRPr lang="en-US"/>
           </a:p>
@@ -7484,7 +7484,7 @@
               <a:pPr>
                 <a:defRPr/>
               </a:pPr>
-              <a:t>10/11/2025</a:t>
+              <a:t>11/15/2025</a:t>
             </a:fld>
             <a:endParaRPr lang="en-US"/>
           </a:p>
@@ -7748,7 +7748,7 @@
               <a:pPr>
                 <a:defRPr/>
               </a:pPr>
-              <a:t>10/11/2025</a:t>
+              <a:t>11/15/2025</a:t>
             </a:fld>
             <a:endParaRPr lang="en-US"/>
           </a:p>
@@ -7913,7 +7913,7 @@
               <a:pPr>
                 <a:defRPr/>
               </a:pPr>
-              <a:t>10/11/2025</a:t>
+              <a:t>11/15/2025</a:t>
             </a:fld>
             <a:endParaRPr lang="en-US" dirty="0"/>
           </a:p>
@@ -8160,7 +8160,7 @@
               <a:pPr>
                 <a:defRPr/>
               </a:pPr>
-              <a:t>10/11/2025</a:t>
+              <a:t>11/15/2025</a:t>
             </a:fld>
             <a:endParaRPr lang="en-US"/>
           </a:p>
@@ -8317,7 +8317,7 @@
               <a:pPr>
                 <a:defRPr/>
               </a:pPr>
-              <a:t>10/11/2025</a:t>
+              <a:t>11/15/2025</a:t>
             </a:fld>
             <a:endParaRPr lang="en-US"/>
           </a:p>
@@ -8484,7 +8484,7 @@
               <a:pPr>
                 <a:defRPr/>
               </a:pPr>
-              <a:t>10/11/2025</a:t>
+              <a:t>11/15/2025</a:t>
             </a:fld>
             <a:endParaRPr lang="en-US"/>
           </a:p>
@@ -8718,7 +8718,7 @@
               <a:pPr>
                 <a:defRPr/>
               </a:pPr>
-              <a:t>10/11/2025</a:t>
+              <a:t>11/15/2025</a:t>
             </a:fld>
             <a:endParaRPr lang="en-US"/>
           </a:p>
@@ -8992,7 +8992,7 @@
               <a:pPr>
                 <a:defRPr/>
               </a:pPr>
-              <a:t>10/11/2025</a:t>
+              <a:t>11/15/2025</a:t>
             </a:fld>
             <a:endParaRPr lang="en-US"/>
           </a:p>
@@ -9405,7 +9405,7 @@
               <a:pPr>
                 <a:defRPr/>
               </a:pPr>
-              <a:t>10/11/2025</a:t>
+              <a:t>11/15/2025</a:t>
             </a:fld>
             <a:endParaRPr lang="en-US"/>
           </a:p>
@@ -9511,7 +9511,7 @@
               <a:pPr>
                 <a:defRPr/>
               </a:pPr>
-              <a:t>10/11/2025</a:t>
+              <a:t>11/15/2025</a:t>
             </a:fld>
             <a:endParaRPr lang="en-US"/>
           </a:p>
@@ -9595,7 +9595,7 @@
               <a:pPr>
                 <a:defRPr/>
               </a:pPr>
-              <a:t>10/11/2025</a:t>
+              <a:t>11/15/2025</a:t>
             </a:fld>
             <a:endParaRPr lang="en-US"/>
           </a:p>
@@ -9859,7 +9859,7 @@
               <a:pPr>
                 <a:defRPr/>
               </a:pPr>
-              <a:t>10/11/2025</a:t>
+              <a:t>11/15/2025</a:t>
             </a:fld>
             <a:endParaRPr lang="en-US"/>
           </a:p>
@@ -10103,7 +10103,7 @@
               <a:pPr>
                 <a:defRPr/>
               </a:pPr>
-              <a:t>10/11/2025</a:t>
+              <a:t>11/15/2025</a:t>
             </a:fld>
             <a:endParaRPr lang="en-US"/>
           </a:p>
@@ -10336,7 +10336,7 @@
               <a:pPr>
                 <a:defRPr/>
               </a:pPr>
-              <a:t>10/11/2025</a:t>
+              <a:t>11/15/2025</a:t>
             </a:fld>
             <a:endParaRPr lang="en-US"/>
           </a:p>
@@ -11015,7 +11015,7 @@
               <a:pPr>
                 <a:defRPr/>
               </a:pPr>
-              <a:t>10/11/2025</a:t>
+              <a:t>11/15/2025</a:t>
             </a:fld>
             <a:endParaRPr lang="en-US"/>
           </a:p>
@@ -11789,7 +11789,7 @@
           <a:p>
             <a:r>
               <a:rPr lang="en-US" dirty="0"/>
-              <a:t>Contributors listed on each topic</a:t>
+              <a:t>Contributors in GitHub commit history</a:t>
             </a:r>
           </a:p>
           <a:p>
@@ -11801,7 +11801,7 @@
           <a:p>
             <a:r>
               <a:rPr lang="en-US" dirty="0"/>
-              <a:t>Contribute in the browser</a:t>
+              <a:t>Make contributions in your browser</a:t>
             </a:r>
           </a:p>
           <a:p>
@@ -12176,7 +12176,7 @@
           <a:p>
             <a:r>
               <a:rPr lang="en-US" sz="2800" dirty="0"/>
-              <a:t>Working with markdown</a:t>
+              <a:t>Work with markdown</a:t>
             </a:r>
           </a:p>
           <a:p>
@@ -12192,14 +12192,16 @@
             </a:r>
           </a:p>
           <a:p>
-            <a:r>
-              <a:rPr lang="en-US" sz="2800" dirty="0"/>
-              <a:t>The PR review process</a:t>
-            </a:r>
-          </a:p>
-          <a:p>
-            <a:r>
-              <a:rPr lang="en-US" sz="2800" dirty="0"/>
+            <a:pPr lvl="1"/>
+            <a:r>
+              <a:rPr lang="en-US" sz="2400" dirty="0"/>
+              <a:t>PR review process</a:t>
+            </a:r>
+          </a:p>
+          <a:p>
+            <a:pPr lvl="1"/>
+            <a:r>
+              <a:rPr lang="en-US" sz="2400" dirty="0"/>
               <a:t>Additional commits and suggesting changes</a:t>
             </a:r>
           </a:p>
@@ -12430,7 +12432,7 @@
         <p:spPr>
           <a:xfrm>
             <a:off x="457200" y="1131590"/>
-            <a:ext cx="4038600" cy="2545556"/>
+            <a:ext cx="8229600" cy="3024336"/>
           </a:xfrm>
         </p:spPr>
         <p:txBody>
@@ -12438,79 +12440,47 @@
           <a:lstStyle/>
           <a:p>
             <a:r>
-              <a:rPr lang="en-US" sz="2000" dirty="0"/>
+              <a:rPr lang="en-US" dirty="0"/>
               <a:t>GitHub Issue – suggest changes or report a problem</a:t>
             </a:r>
           </a:p>
           <a:p>
             <a:r>
-              <a:rPr lang="en-US" sz="2000" dirty="0"/>
+              <a:rPr lang="en-US" dirty="0"/>
               <a:t>Feedback – anonymous feedback, no follow-up</a:t>
             </a:r>
           </a:p>
           <a:p>
             <a:r>
-              <a:rPr lang="en-US" sz="2000" dirty="0"/>
+              <a:rPr lang="en-US" dirty="0"/>
               <a:t>PR – contribute directly to articles</a:t>
             </a:r>
           </a:p>
           <a:p>
             <a:r>
-              <a:rPr lang="en-US" sz="2000" dirty="0"/>
+              <a:rPr lang="en-US" dirty="0"/>
               <a:t>Guidance: </a:t>
             </a:r>
             <a:r>
-              <a:rPr lang="en-US" sz="2000" dirty="0">
+              <a:rPr lang="en-US" dirty="0">
                 <a:hlinkClick r:id="rId3"/>
               </a:rPr>
               <a:t>learn.microsoft.com/contribute</a:t>
             </a:r>
             <a:r>
-              <a:rPr lang="en-US" sz="2000" dirty="0"/>
+              <a:rPr lang="en-US" dirty="0"/>
               <a:t> </a:t>
             </a:r>
           </a:p>
           <a:p>
             <a:r>
-              <a:rPr lang="en-US" sz="2000" dirty="0"/>
+              <a:rPr lang="en-US" dirty="0"/>
               <a:t>Get credit with a PR!</a:t>
             </a:r>
-            <a:endParaRPr lang="en-US" dirty="0"/>
-          </a:p>
-        </p:txBody>
-      </p:sp>
-      <p:pic>
-        <p:nvPicPr>
-          <p:cNvPr id="5" name="Content Placeholder 5" descr="A screenshot of the Contained Databases popup &quot;Contributors to this article&quot; window">
-            <a:extLst>
-              <a:ext uri="{FF2B5EF4-FFF2-40B4-BE49-F238E27FC236}">
-                <a16:creationId xmlns:a16="http://schemas.microsoft.com/office/drawing/2014/main" id="{9ECD1A99-32B4-6E59-5A0F-B14962283DC6}"/>
-              </a:ext>
-            </a:extLst>
-          </p:cNvPr>
-          <p:cNvPicPr>
-            <a:picLocks noGrp="1" noChangeAspect="1"/>
-          </p:cNvPicPr>
-          <p:nvPr>
-            <p:ph sz="half" idx="2"/>
-          </p:nvPr>
-        </p:nvPicPr>
-        <p:blipFill>
-          <a:blip r:embed="rId4"/>
-          <a:stretch>
-            <a:fillRect/>
-          </a:stretch>
-        </p:blipFill>
-        <p:spPr>
-          <a:xfrm>
-            <a:off x="4705669" y="1275606"/>
-            <a:ext cx="3969837" cy="2546350"/>
-          </a:xfrm>
-          <a:prstGeom prst="rect">
-            <a:avLst/>
-          </a:prstGeom>
-        </p:spPr>
-      </p:pic>
+            <a:endParaRPr lang="en-US" sz="3600" dirty="0"/>
+          </a:p>
+        </p:txBody>
+      </p:sp>
     </p:spTree>
     <p:extLst>
       <p:ext uri="{BB962C8B-B14F-4D97-AF65-F5344CB8AC3E}">
@@ -12521,92 +12491,6 @@
   <p:clrMapOvr>
     <a:masterClrMapping/>
   </p:clrMapOvr>
-  <p:timing>
-    <p:tnLst>
-      <p:par>
-        <p:cTn id="1" dur="indefinite" restart="never" nodeType="tmRoot">
-          <p:childTnLst>
-            <p:seq concurrent="1" nextAc="seek">
-              <p:cTn id="2" dur="indefinite" nodeType="mainSeq">
-                <p:childTnLst>
-                  <p:par>
-                    <p:cTn id="3" fill="hold">
-                      <p:stCondLst>
-                        <p:cond delay="indefinite"/>
-                        <p:cond evt="onBegin" delay="0">
-                          <p:tn val="2"/>
-                        </p:cond>
-                      </p:stCondLst>
-                      <p:childTnLst>
-                        <p:par>
-                          <p:cTn id="4" fill="hold">
-                            <p:stCondLst>
-                              <p:cond delay="0"/>
-                            </p:stCondLst>
-                            <p:childTnLst>
-                              <p:par>
-                                <p:cTn id="5" presetID="22" presetClass="entr" presetSubtype="8" fill="hold" nodeType="afterEffect">
-                                  <p:stCondLst>
-                                    <p:cond delay="0"/>
-                                  </p:stCondLst>
-                                  <p:childTnLst>
-                                    <p:set>
-                                      <p:cBhvr>
-                                        <p:cTn id="6" dur="1" fill="hold">
-                                          <p:stCondLst>
-                                            <p:cond delay="0"/>
-                                          </p:stCondLst>
-                                        </p:cTn>
-                                        <p:tgtEl>
-                                          <p:spTgt spid="5"/>
-                                        </p:tgtEl>
-                                        <p:attrNameLst>
-                                          <p:attrName>style.visibility</p:attrName>
-                                        </p:attrNameLst>
-                                      </p:cBhvr>
-                                      <p:to>
-                                        <p:strVal val="visible"/>
-                                      </p:to>
-                                    </p:set>
-                                    <p:animEffect transition="in" filter="wipe(left)">
-                                      <p:cBhvr>
-                                        <p:cTn id="7" dur="500"/>
-                                        <p:tgtEl>
-                                          <p:spTgt spid="5"/>
-                                        </p:tgtEl>
-                                      </p:cBhvr>
-                                    </p:animEffect>
-                                  </p:childTnLst>
-                                </p:cTn>
-                              </p:par>
-                            </p:childTnLst>
-                          </p:cTn>
-                        </p:par>
-                      </p:childTnLst>
-                    </p:cTn>
-                  </p:par>
-                </p:childTnLst>
-              </p:cTn>
-              <p:prevCondLst>
-                <p:cond evt="onPrev" delay="0">
-                  <p:tgtEl>
-                    <p:sldTgt/>
-                  </p:tgtEl>
-                </p:cond>
-              </p:prevCondLst>
-              <p:nextCondLst>
-                <p:cond evt="onNext" delay="0">
-                  <p:tgtEl>
-                    <p:sldTgt/>
-                  </p:tgtEl>
-                </p:cond>
-              </p:nextCondLst>
-            </p:seq>
-          </p:childTnLst>
-        </p:cTn>
-      </p:par>
-    </p:tnLst>
-  </p:timing>
 </p:sld>
 </file>
 
@@ -12640,16 +12524,23 @@
             <a:spLocks noGrp="1"/>
           </p:cNvSpPr>
           <p:nvPr>
-            <p:ph type="title"/>
-          </p:nvPr>
-        </p:nvSpPr>
-        <p:spPr/>
-        <p:txBody>
-          <a:bodyPr/>
+            <p:ph type="ctrTitle"/>
+          </p:nvPr>
+        </p:nvSpPr>
+        <p:spPr>
+          <a:xfrm>
+            <a:off x="685800" y="1597821"/>
+            <a:ext cx="7772400" cy="1102519"/>
+          </a:xfrm>
+        </p:spPr>
+        <p:txBody>
+          <a:bodyPr wrap="square" anchor="ctr">
+            <a:normAutofit/>
+          </a:bodyPr>
           <a:lstStyle/>
           <a:p>
             <a:r>
-              <a:rPr lang="en-US" sz="3600" dirty="0"/>
+              <a:rPr lang="en-US"/>
               <a:t>Bonus: Our Docs Workflow</a:t>
             </a:r>
           </a:p>
@@ -12668,12 +12559,19 @@
             <a:spLocks noGrp="1"/>
           </p:cNvSpPr>
           <p:nvPr>
-            <p:ph type="body" idx="1"/>
-          </p:nvPr>
-        </p:nvSpPr>
-        <p:spPr/>
-        <p:txBody>
-          <a:bodyPr/>
+            <p:ph type="subTitle" idx="1"/>
+          </p:nvPr>
+        </p:nvSpPr>
+        <p:spPr>
+          <a:xfrm>
+            <a:off x="1371600" y="2914650"/>
+            <a:ext cx="6400800" cy="1314450"/>
+          </a:xfrm>
+        </p:spPr>
+        <p:txBody>
+          <a:bodyPr wrap="square" anchor="t">
+            <a:normAutofit/>
+          </a:bodyPr>
           <a:lstStyle/>
           <a:p>
             <a:r>
@@ -12763,19 +12661,19 @@
           <a:lstStyle/>
           <a:p>
             <a:r>
-              <a:rPr lang="en-US" dirty="0"/>
-              <a:t>VS Code, Learn Authoring Pack, GitHub, Azure DevOps</a:t>
-            </a:r>
-          </a:p>
-          <a:p>
-            <a:r>
-              <a:rPr lang="en-US" dirty="0"/>
-              <a:t>Rich metadata and SEO tracking, Azure Databricks &amp; Power BI</a:t>
-            </a:r>
-          </a:p>
-          <a:p>
-            <a:r>
-              <a:rPr lang="en-US" dirty="0"/>
+              <a:rPr lang="en-US" sz="2800" dirty="0"/>
+              <a:t>VS Code, Learn Authoring Pack, GitHub Copilot, DocuMentor, GitHub, Azure DevOps</a:t>
+            </a:r>
+          </a:p>
+          <a:p>
+            <a:r>
+              <a:rPr lang="en-US" sz="2800" dirty="0"/>
+              <a:t>Rich metadata and SEO tracking &amp; Power BI reports</a:t>
+            </a:r>
+          </a:p>
+          <a:p>
+            <a:r>
+              <a:rPr lang="en-US" sz="2800" dirty="0"/>
               <a:t>Release branches for big, timed doc releases (think Build &amp; Ignite)</a:t>
             </a:r>
           </a:p>
@@ -12989,7 +12887,12 @@
             <p:ph idx="1"/>
           </p:nvPr>
         </p:nvSpPr>
-        <p:spPr/>
+        <p:spPr>
+          <a:xfrm>
+            <a:off x="457200" y="1200150"/>
+            <a:ext cx="8229600" cy="3603847"/>
+          </a:xfrm>
+        </p:spPr>
         <p:txBody>
           <a:bodyPr/>
           <a:lstStyle/>
@@ -13036,27 +12939,6 @@
           </a:p>
           <a:p>
             <a:r>
-              <a:rPr lang="en-US" sz="1600" dirty="0" err="1"/>
-              <a:t>GitLens</a:t>
-            </a:r>
-            <a:endParaRPr lang="en-US" sz="1600" dirty="0"/>
-          </a:p>
-          <a:p>
-            <a:pPr lvl="1"/>
-            <a:r>
-              <a:rPr lang="en-US" sz="1400" dirty="0"/>
-              <a:t>Enhanced commit history with visualizations</a:t>
-            </a:r>
-          </a:p>
-          <a:p>
-            <a:pPr lvl="1"/>
-            <a:r>
-              <a:rPr lang="en-US" sz="1400" dirty="0"/>
-              <a:t>Comparison commands</a:t>
-            </a:r>
-          </a:p>
-          <a:p>
-            <a:r>
               <a:rPr lang="en-US" sz="1600" dirty="0"/>
               <a:t>GitHub Pull Requests and Issues</a:t>
             </a:r>
@@ -13071,6 +12953,18 @@
           <a:p>
             <a:r>
               <a:rPr lang="en-US" sz="1600" dirty="0"/>
+              <a:t>DocuMentor</a:t>
+            </a:r>
+          </a:p>
+          <a:p>
+            <a:r>
+              <a:rPr lang="en-US" sz="1600" dirty="0"/>
+              <a:t>Learn Authoring Assistant</a:t>
+            </a:r>
+          </a:p>
+          <a:p>
+            <a:r>
+              <a:rPr lang="en-US" sz="1600" dirty="0"/>
               <a:t>GitHub Copilot</a:t>
             </a:r>
           </a:p>
@@ -13080,7 +12974,13 @@
               <a:rPr lang="en-US" sz="1400" dirty="0"/>
               <a:t>Get markdown suggestions as you type</a:t>
             </a:r>
-            <a:endParaRPr lang="en-US" dirty="0"/>
+          </a:p>
+          <a:p>
+            <a:pPr lvl="1"/>
+            <a:r>
+              <a:rPr lang="en-US" sz="1400" dirty="0"/>
+              <a:t>Make edit passes for style &amp; consistency</a:t>
+            </a:r>
           </a:p>
         </p:txBody>
       </p:sp>
@@ -13335,6 +13235,12 @@
               <a:t>Public &amp; private repos – GitHub &amp; Azure DevOps</a:t>
             </a:r>
           </a:p>
+          <a:p>
+            <a:r>
+              <a:rPr lang="en-US" sz="2800" dirty="0"/>
+              <a:t>Leverage AI for efficiency and consistency</a:t>
+            </a:r>
+          </a:p>
         </p:txBody>
       </p:sp>
     </p:spTree>
@@ -13380,12 +13286,19 @@
             <a:spLocks noGrp="1"/>
           </p:cNvSpPr>
           <p:nvPr>
-            <p:ph type="title"/>
-          </p:nvPr>
-        </p:nvSpPr>
-        <p:spPr/>
-        <p:txBody>
-          <a:bodyPr/>
+            <p:ph type="ctrTitle"/>
+          </p:nvPr>
+        </p:nvSpPr>
+        <p:spPr>
+          <a:xfrm>
+            <a:off x="685800" y="1597821"/>
+            <a:ext cx="7772400" cy="1102519"/>
+          </a:xfrm>
+        </p:spPr>
+        <p:txBody>
+          <a:bodyPr wrap="square" anchor="ctr">
+            <a:normAutofit/>
+          </a:bodyPr>
           <a:lstStyle/>
           <a:p>
             <a:r>
@@ -13408,12 +13321,19 @@
             <a:spLocks noGrp="1"/>
           </p:cNvSpPr>
           <p:nvPr>
-            <p:ph type="body" idx="1"/>
-          </p:nvPr>
-        </p:nvSpPr>
-        <p:spPr/>
-        <p:txBody>
-          <a:bodyPr/>
+            <p:ph type="subTitle" idx="1"/>
+          </p:nvPr>
+        </p:nvSpPr>
+        <p:spPr>
+          <a:xfrm>
+            <a:off x="1371600" y="2914650"/>
+            <a:ext cx="6400800" cy="1314450"/>
+          </a:xfrm>
+        </p:spPr>
+        <p:txBody>
+          <a:bodyPr wrap="square" anchor="t">
+            <a:normAutofit/>
+          </a:bodyPr>
           <a:lstStyle/>
           <a:p>
             <a:r>
@@ -13955,24 +13875,24 @@
         <p:spPr>
           <a:xfrm>
             <a:off x="457200" y="1131590"/>
-            <a:ext cx="8229600" cy="3394472"/>
+            <a:ext cx="8229600" cy="3816424"/>
           </a:xfrm>
         </p:spPr>
         <p:txBody>
           <a:bodyPr>
-            <a:normAutofit lnSpcReduction="10000"/>
+            <a:normAutofit fontScale="92500" lnSpcReduction="10000"/>
           </a:bodyPr>
           <a:lstStyle/>
           <a:p>
             <a:r>
               <a:rPr lang="en-US" dirty="0"/>
-              <a:t>Software industry for nearly 30 years</a:t>
+              <a:t>Software industry for 30 years</a:t>
             </a:r>
           </a:p>
           <a:p>
             <a:r>
               <a:rPr lang="en-US" dirty="0"/>
-              <a:t>Morning Dew link blog</a:t>
+              <a:t>Morning Dew link blog: alvinashcraft.com</a:t>
             </a:r>
           </a:p>
           <a:p>
@@ -13998,7 +13918,14 @@
           <a:p>
             <a:r>
               <a:rPr lang="en-US" dirty="0"/>
-              <a:t>TechBash dev conference organizer since 2016</a:t>
+              <a:t>TechBash Dev Conference organizer since 2016</a:t>
+            </a:r>
+          </a:p>
+          <a:p>
+            <a:pPr lvl="1"/>
+            <a:r>
+              <a:rPr lang="en-US" dirty="0"/>
+              <a:t>TechBash 2026: Oct 13-16 @ Kalahari Resort Poconos</a:t>
             </a:r>
           </a:p>
         </p:txBody>
@@ -14072,33 +13999,32 @@
             <p:ph idx="1"/>
           </p:nvPr>
         </p:nvSpPr>
-        <p:spPr/>
+        <p:spPr>
+          <a:xfrm>
+            <a:off x="457200" y="1200151"/>
+            <a:ext cx="8229600" cy="3027784"/>
+          </a:xfrm>
+        </p:spPr>
         <p:txBody>
           <a:bodyPr/>
           <a:lstStyle/>
           <a:p>
             <a:r>
               <a:rPr lang="en-US" sz="2400" dirty="0"/>
-              <a:t>Intro to Microsoft Learn</a:t>
+              <a:t>Introduction to Microsoft Learn</a:t>
             </a:r>
           </a:p>
           <a:p>
             <a:r>
               <a:rPr lang="en-US" sz="2400" dirty="0"/>
-              <a:t>Learn tips &amp; tricks for navigating Learn</a:t>
-            </a:r>
-          </a:p>
-          <a:p>
-            <a:pPr lvl="1"/>
-            <a:r>
-              <a:rPr lang="en-US" sz="2000" dirty="0"/>
-              <a:t>Docs as Code in GitHub</a:t>
-            </a:r>
+              <a:t>Tips &amp; tricks for navigating Learn</a:t>
+            </a:r>
+            <a:endParaRPr lang="en-US" sz="2000" dirty="0"/>
           </a:p>
           <a:p>
             <a:r>
               <a:rPr lang="en-US" sz="2400" dirty="0"/>
-              <a:t>Learn documentation is open-source</a:t>
+              <a:t>Learn documentation is open-source on GitHub</a:t>
             </a:r>
           </a:p>
           <a:p>
@@ -14116,9 +14042,10 @@
             </a:r>
           </a:p>
           <a:p>
-            <a:r>
-              <a:rPr lang="en-US" sz="2400" dirty="0"/>
-              <a:t>Submit PRs for simple changes</a:t>
+            <a:pPr lvl="1"/>
+            <a:r>
+              <a:rPr lang="en-US" sz="2000" dirty="0"/>
+              <a:t>Submit pull requests to make changes</a:t>
             </a:r>
           </a:p>
           <a:p>
@@ -14212,53 +14139,81 @@
           <a:lstStyle/>
           <a:p>
             <a:r>
-              <a:rPr lang="en-US" sz="2800" dirty="0"/>
+              <a:rPr lang="en-US" sz="2400" dirty="0"/>
               <a:t>Documentation – </a:t>
             </a:r>
             <a:r>
-              <a:rPr lang="en-US" sz="2800" dirty="0">
+              <a:rPr lang="en-US" sz="2400" dirty="0">
                 <a:hlinkClick r:id="rId3"/>
               </a:rPr>
               <a:t>https://learn.microsoft.com/docs</a:t>
             </a:r>
             <a:r>
-              <a:rPr lang="en-US" sz="2800" dirty="0"/>
+              <a:rPr lang="en-US" sz="2400" dirty="0"/>
               <a:t> </a:t>
             </a:r>
           </a:p>
           <a:p>
             <a:r>
-              <a:rPr lang="en-US" sz="2800" dirty="0"/>
+              <a:rPr lang="en-US" sz="2400" dirty="0"/>
               <a:t>Training – </a:t>
             </a:r>
             <a:r>
-              <a:rPr lang="en-US" sz="2800" dirty="0">
+              <a:rPr lang="en-US" sz="2400" dirty="0">
                 <a:hlinkClick r:id="rId4"/>
               </a:rPr>
               <a:t>https://learn.microsoft.com/training</a:t>
             </a:r>
             <a:r>
-              <a:rPr lang="en-US" sz="2800" dirty="0"/>
+              <a:rPr lang="en-US" sz="2400" dirty="0"/>
               <a:t> </a:t>
             </a:r>
           </a:p>
           <a:p>
             <a:r>
-              <a:rPr lang="en-US" sz="2800" dirty="0"/>
+              <a:rPr lang="en-US" sz="2400" dirty="0"/>
               <a:t>Q&amp;A – </a:t>
             </a:r>
             <a:r>
-              <a:rPr lang="en-US" sz="2800" dirty="0">
+              <a:rPr lang="en-US" sz="2400" dirty="0">
                 <a:hlinkClick r:id="rId5"/>
               </a:rPr>
               <a:t>https://learn.microsoft.com/answers</a:t>
             </a:r>
-            <a:endParaRPr lang="en-US" sz="2800" dirty="0"/>
-          </a:p>
-          <a:p>
-            <a:r>
-              <a:rPr lang="en-US" sz="2800" dirty="0"/>
-              <a:t>Credentials, Code samples, Assessments, Video</a:t>
+            <a:endParaRPr lang="en-US" sz="2400" dirty="0"/>
+          </a:p>
+          <a:p>
+            <a:r>
+              <a:rPr lang="en-US" sz="2400" dirty="0"/>
+              <a:t>Other areas</a:t>
+            </a:r>
+          </a:p>
+          <a:p>
+            <a:pPr lvl="1"/>
+            <a:r>
+              <a:rPr lang="en-US" sz="2000" dirty="0"/>
+              <a:t>Credentials &amp; certifications</a:t>
+            </a:r>
+          </a:p>
+          <a:p>
+            <a:pPr lvl="1"/>
+            <a:r>
+              <a:rPr lang="en-US" sz="2000" dirty="0"/>
+              <a:t>Code samples</a:t>
+            </a:r>
+          </a:p>
+          <a:p>
+            <a:pPr lvl="1"/>
+            <a:r>
+              <a:rPr lang="en-US" sz="2000" dirty="0"/>
+              <a:t>Assessments</a:t>
+            </a:r>
+          </a:p>
+          <a:p>
+            <a:pPr lvl="1"/>
+            <a:r>
+              <a:rPr lang="en-US" sz="2000" dirty="0"/>
+              <a:t>Video</a:t>
             </a:r>
           </a:p>
         </p:txBody>
@@ -14376,7 +14331,14 @@
           <a:p>
             <a:r>
               <a:rPr lang="en-US" sz="2800" dirty="0"/>
-              <a:t>Technical background</a:t>
+              <a:t>Different backgrounds</a:t>
+            </a:r>
+          </a:p>
+          <a:p>
+            <a:pPr lvl="1"/>
+            <a:r>
+              <a:rPr lang="en-US" sz="2400" dirty="0"/>
+              <a:t>Technical, writing, teaching</a:t>
             </a:r>
           </a:p>
         </p:txBody>
@@ -14424,12 +14386,19 @@
             <a:spLocks noGrp="1"/>
           </p:cNvSpPr>
           <p:nvPr>
-            <p:ph type="title"/>
-          </p:nvPr>
-        </p:nvSpPr>
-        <p:spPr/>
-        <p:txBody>
-          <a:bodyPr/>
+            <p:ph type="ctrTitle"/>
+          </p:nvPr>
+        </p:nvSpPr>
+        <p:spPr>
+          <a:xfrm>
+            <a:off x="685800" y="1597821"/>
+            <a:ext cx="7772400" cy="1102519"/>
+          </a:xfrm>
+        </p:spPr>
+        <p:txBody>
+          <a:bodyPr wrap="square" anchor="ctr">
+            <a:normAutofit/>
+          </a:bodyPr>
           <a:lstStyle/>
           <a:p>
             <a:r>
@@ -14452,12 +14421,19 @@
             <a:spLocks noGrp="1"/>
           </p:cNvSpPr>
           <p:nvPr>
-            <p:ph type="body" idx="1"/>
-          </p:nvPr>
-        </p:nvSpPr>
-        <p:spPr/>
-        <p:txBody>
-          <a:bodyPr/>
+            <p:ph type="subTitle" idx="1"/>
+          </p:nvPr>
+        </p:nvSpPr>
+        <p:spPr>
+          <a:xfrm>
+            <a:off x="1371600" y="2914650"/>
+            <a:ext cx="6400800" cy="1314450"/>
+          </a:xfrm>
+        </p:spPr>
+        <p:txBody>
+          <a:bodyPr wrap="square" anchor="t">
+            <a:normAutofit/>
+          </a:bodyPr>
           <a:lstStyle/>
           <a:p>
             <a:r>
@@ -14548,7 +14524,7 @@
           <a:p>
             <a:r>
               <a:rPr lang="en-US" dirty="0"/>
-              <a:t>Saving to Collections</a:t>
+              <a:t>Save to Collections &amp; Plans</a:t>
             </a:r>
           </a:p>
           <a:p>
@@ -14560,13 +14536,13 @@
           <a:p>
             <a:r>
               <a:rPr lang="en-US" dirty="0"/>
-              <a:t>Searching content</a:t>
+              <a:t>Search content</a:t>
             </a:r>
           </a:p>
           <a:p>
             <a:r>
               <a:rPr lang="en-US" dirty="0"/>
-              <a:t>Navigating documentation pages</a:t>
+              <a:t>Navigate documentation pages</a:t>
             </a:r>
           </a:p>
           <a:p>
@@ -14578,7 +14554,7 @@
           <a:p>
             <a:r>
               <a:rPr lang="en-US" dirty="0"/>
-              <a:t>Working with versioned content</a:t>
+              <a:t>Work with versioned content</a:t>
             </a:r>
           </a:p>
         </p:txBody>
@@ -14626,12 +14602,19 @@
             <a:spLocks noGrp="1"/>
           </p:cNvSpPr>
           <p:nvPr>
-            <p:ph type="title"/>
-          </p:nvPr>
-        </p:nvSpPr>
-        <p:spPr/>
-        <p:txBody>
-          <a:bodyPr/>
+            <p:ph type="ctrTitle"/>
+          </p:nvPr>
+        </p:nvSpPr>
+        <p:spPr>
+          <a:xfrm>
+            <a:off x="685800" y="1597821"/>
+            <a:ext cx="7772400" cy="1102519"/>
+          </a:xfrm>
+        </p:spPr>
+        <p:txBody>
+          <a:bodyPr wrap="square" anchor="ctr">
+            <a:normAutofit/>
+          </a:bodyPr>
           <a:lstStyle/>
           <a:p>
             <a:r>
@@ -14654,12 +14637,19 @@
             <a:spLocks noGrp="1"/>
           </p:cNvSpPr>
           <p:nvPr>
-            <p:ph type="body" idx="1"/>
-          </p:nvPr>
-        </p:nvSpPr>
-        <p:spPr/>
-        <p:txBody>
-          <a:bodyPr/>
+            <p:ph type="subTitle" idx="1"/>
+          </p:nvPr>
+        </p:nvSpPr>
+        <p:spPr>
+          <a:xfrm>
+            <a:off x="1371600" y="2914650"/>
+            <a:ext cx="6400800" cy="1314450"/>
+          </a:xfrm>
+        </p:spPr>
+        <p:txBody>
+          <a:bodyPr wrap="square" anchor="t">
+            <a:normAutofit/>
+          </a:bodyPr>
           <a:lstStyle/>
           <a:p>
             <a:r>

</xml_diff>

<commit_message>
Update Learn slides for live360 orlando 25
</commit_message>
<xml_diff>
--- a/2025/1116_VSLiveOrlando/Contributing to Learn/VSLive Orlando 25 - Become a MS Learn Contributor_AlvinAshcraft.pptx
+++ b/2025/1116_VSLiveOrlando/Contributing to Learn/VSLive Orlando 25 - Become a MS Learn Contributor_AlvinAshcraft.pptx
@@ -432,7 +432,7 @@
               <a:pPr>
                 <a:defRPr/>
               </a:pPr>
-              <a:t>11/17/2025</a:t>
+              <a:t>11/18/2025</a:t>
             </a:fld>
             <a:endParaRPr lang="en-US"/>
           </a:p>
@@ -3690,7 +3690,7 @@
           <a:p>
             <a:r>
               <a:rPr lang="en-US" dirty="0"/>
-              <a:t>Any final questions? Look for me this afternoon or tomorrow.</a:t>
+              <a:t>Any final questions? Look for me this afternoon in the speaker corner, all week at sessions, and come to my .NET MAUI Toolkit session on Thursday!</a:t>
             </a:r>
           </a:p>
         </p:txBody>
@@ -3941,7 +3941,7 @@
                 <a:latin typeface="+mn-lt"/>
                 <a:cs typeface="Calibri"/>
               </a:rPr>
-              <a:t>We’ll see how our content teams at Microsoft create docs as code in GitHub. Yes, the content on Learn is open source on GitHub.</a:t>
+              <a:t>Next, we'll see how you can contribute to Learn with feedback, GitHub issues, and pull requests.</a:t>
             </a:r>
           </a:p>
           <a:p>
@@ -3951,27 +3951,85 @@
             </a:endParaRPr>
           </a:p>
           <a:p>
+            <a:pPr marL="0" marR="0" lvl="0" indent="0" algn="l" defTabSz="914400" rtl="0" eaLnBrk="1" fontAlgn="base" latinLnBrk="0" hangingPunct="1">
+              <a:lnSpc>
+                <a:spcPct val="100000"/>
+              </a:lnSpc>
+              <a:spcBef>
+                <a:spcPct val="30000"/>
+              </a:spcBef>
+              <a:spcAft>
+                <a:spcPct val="0"/>
+              </a:spcAft>
+              <a:buClrTx/>
+              <a:buSzTx/>
+              <a:buFontTx/>
+              <a:buNone/>
+              <a:tabLst/>
+              <a:defRPr/>
+            </a:pPr>
             <a:r>
               <a:rPr lang="en-US" sz="1200" dirty="0">
                 <a:latin typeface="+mn-lt"/>
                 <a:cs typeface="Calibri"/>
               </a:rPr>
-              <a:t>Next, we'll see how you can contribute to Learn with feedback, GitHub issues, and pull requests.</a:t>
-            </a:r>
-          </a:p>
-          <a:p>
-            <a:endParaRPr lang="en-US" sz="1200" dirty="0">
+              <a:t>If there’s time, we’ll see how our content teams at Microsoft create docs as code in GitHub.</a:t>
+            </a:r>
+          </a:p>
+          <a:p>
+            <a:pPr marL="0" marR="0" lvl="0" indent="0" algn="l" defTabSz="914400" rtl="0" eaLnBrk="1" fontAlgn="base" latinLnBrk="0" hangingPunct="1">
+              <a:lnSpc>
+                <a:spcPct val="100000"/>
+              </a:lnSpc>
+              <a:spcBef>
+                <a:spcPct val="30000"/>
+              </a:spcBef>
+              <a:spcAft>
+                <a:spcPct val="0"/>
+              </a:spcAft>
+              <a:buClrTx/>
+              <a:buSzTx/>
+              <a:buFontTx/>
+              <a:buNone/>
+              <a:tabLst/>
+              <a:defRPr/>
+            </a:pPr>
+            <a:endParaRPr lang="en-US" sz="1200">
               <a:latin typeface="+mn-lt"/>
               <a:cs typeface="Calibri"/>
             </a:endParaRPr>
           </a:p>
           <a:p>
+            <a:pPr marL="0" marR="0" lvl="0" indent="0" algn="l" defTabSz="914400" rtl="0" eaLnBrk="1" fontAlgn="base" latinLnBrk="0" hangingPunct="1">
+              <a:lnSpc>
+                <a:spcPct val="100000"/>
+              </a:lnSpc>
+              <a:spcBef>
+                <a:spcPct val="30000"/>
+              </a:spcBef>
+              <a:spcAft>
+                <a:spcPct val="0"/>
+              </a:spcAft>
+              <a:buClrTx/>
+              <a:buSzTx/>
+              <a:buFontTx/>
+              <a:buNone/>
+              <a:tabLst/>
+              <a:defRPr/>
+            </a:pPr>
+            <a:r>
+              <a:rPr lang="en-US" sz="1200">
+                <a:latin typeface="+mn-lt"/>
+                <a:cs typeface="Calibri"/>
+              </a:rPr>
+              <a:t>And </a:t>
+            </a:r>
             <a:r>
               <a:rPr lang="en-US" sz="1200" dirty="0">
                 <a:latin typeface="+mn-lt"/>
                 <a:cs typeface="Calibri"/>
               </a:rPr>
-              <a:t>And we’ll wrap up with a list of resources that you can also grab from my Speaking repo on GitHub.</a:t>
+              <a:t>we’ll wrap up with a list of resources that you can also grab from my Speaking repo on GitHub.</a:t>
             </a:r>
           </a:p>
         </p:txBody>
@@ -5652,7 +5710,7 @@
               <a:pPr>
                 <a:defRPr/>
               </a:pPr>
-              <a:t>11/17/2025</a:t>
+              <a:t>11/18/2025</a:t>
             </a:fld>
             <a:endParaRPr lang="en-US"/>
           </a:p>
@@ -5809,7 +5867,7 @@
               <a:pPr>
                 <a:defRPr/>
               </a:pPr>
-              <a:t>11/17/2025</a:t>
+              <a:t>11/18/2025</a:t>
             </a:fld>
             <a:endParaRPr lang="en-US"/>
           </a:p>
@@ -5976,7 +6034,7 @@
               <a:pPr>
                 <a:defRPr/>
               </a:pPr>
-              <a:t>11/17/2025</a:t>
+              <a:t>11/18/2025</a:t>
             </a:fld>
             <a:endParaRPr lang="en-US"/>
           </a:p>
@@ -6206,7 +6264,7 @@
               <a:pPr>
                 <a:defRPr/>
               </a:pPr>
-              <a:t>11/17/2025</a:t>
+              <a:t>11/18/2025</a:t>
             </a:fld>
             <a:endParaRPr lang="en-US"/>
           </a:p>
@@ -6373,7 +6431,7 @@
               <a:pPr>
                 <a:defRPr/>
               </a:pPr>
-              <a:t>11/17/2025</a:t>
+              <a:t>11/18/2025</a:t>
             </a:fld>
             <a:endParaRPr lang="en-US" dirty="0"/>
           </a:p>
@@ -6607,7 +6665,7 @@
               <a:pPr>
                 <a:defRPr/>
               </a:pPr>
-              <a:t>11/17/2025</a:t>
+              <a:t>11/18/2025</a:t>
             </a:fld>
             <a:endParaRPr lang="en-US"/>
           </a:p>
@@ -6881,7 +6939,7 @@
               <a:pPr>
                 <a:defRPr/>
               </a:pPr>
-              <a:t>11/17/2025</a:t>
+              <a:t>11/18/2025</a:t>
             </a:fld>
             <a:endParaRPr lang="en-US"/>
           </a:p>
@@ -7294,7 +7352,7 @@
               <a:pPr>
                 <a:defRPr/>
               </a:pPr>
-              <a:t>11/17/2025</a:t>
+              <a:t>11/18/2025</a:t>
             </a:fld>
             <a:endParaRPr lang="en-US"/>
           </a:p>
@@ -7400,7 +7458,7 @@
               <a:pPr>
                 <a:defRPr/>
               </a:pPr>
-              <a:t>11/17/2025</a:t>
+              <a:t>11/18/2025</a:t>
             </a:fld>
             <a:endParaRPr lang="en-US"/>
           </a:p>
@@ -7484,7 +7542,7 @@
               <a:pPr>
                 <a:defRPr/>
               </a:pPr>
-              <a:t>11/17/2025</a:t>
+              <a:t>11/18/2025</a:t>
             </a:fld>
             <a:endParaRPr lang="en-US"/>
           </a:p>
@@ -7748,7 +7806,7 @@
               <a:pPr>
                 <a:defRPr/>
               </a:pPr>
-              <a:t>11/17/2025</a:t>
+              <a:t>11/18/2025</a:t>
             </a:fld>
             <a:endParaRPr lang="en-US"/>
           </a:p>
@@ -7913,7 +7971,7 @@
               <a:pPr>
                 <a:defRPr/>
               </a:pPr>
-              <a:t>11/17/2025</a:t>
+              <a:t>11/18/2025</a:t>
             </a:fld>
             <a:endParaRPr lang="en-US" dirty="0"/>
           </a:p>
@@ -8160,7 +8218,7 @@
               <a:pPr>
                 <a:defRPr/>
               </a:pPr>
-              <a:t>11/17/2025</a:t>
+              <a:t>11/18/2025</a:t>
             </a:fld>
             <a:endParaRPr lang="en-US"/>
           </a:p>
@@ -8317,7 +8375,7 @@
               <a:pPr>
                 <a:defRPr/>
               </a:pPr>
-              <a:t>11/17/2025</a:t>
+              <a:t>11/18/2025</a:t>
             </a:fld>
             <a:endParaRPr lang="en-US"/>
           </a:p>
@@ -8484,7 +8542,7 @@
               <a:pPr>
                 <a:defRPr/>
               </a:pPr>
-              <a:t>11/17/2025</a:t>
+              <a:t>11/18/2025</a:t>
             </a:fld>
             <a:endParaRPr lang="en-US"/>
           </a:p>
@@ -8718,7 +8776,7 @@
               <a:pPr>
                 <a:defRPr/>
               </a:pPr>
-              <a:t>11/17/2025</a:t>
+              <a:t>11/18/2025</a:t>
             </a:fld>
             <a:endParaRPr lang="en-US"/>
           </a:p>
@@ -8992,7 +9050,7 @@
               <a:pPr>
                 <a:defRPr/>
               </a:pPr>
-              <a:t>11/17/2025</a:t>
+              <a:t>11/18/2025</a:t>
             </a:fld>
             <a:endParaRPr lang="en-US"/>
           </a:p>
@@ -9405,7 +9463,7 @@
               <a:pPr>
                 <a:defRPr/>
               </a:pPr>
-              <a:t>11/17/2025</a:t>
+              <a:t>11/18/2025</a:t>
             </a:fld>
             <a:endParaRPr lang="en-US"/>
           </a:p>
@@ -9511,7 +9569,7 @@
               <a:pPr>
                 <a:defRPr/>
               </a:pPr>
-              <a:t>11/17/2025</a:t>
+              <a:t>11/18/2025</a:t>
             </a:fld>
             <a:endParaRPr lang="en-US"/>
           </a:p>
@@ -9595,7 +9653,7 @@
               <a:pPr>
                 <a:defRPr/>
               </a:pPr>
-              <a:t>11/17/2025</a:t>
+              <a:t>11/18/2025</a:t>
             </a:fld>
             <a:endParaRPr lang="en-US"/>
           </a:p>
@@ -9859,7 +9917,7 @@
               <a:pPr>
                 <a:defRPr/>
               </a:pPr>
-              <a:t>11/17/2025</a:t>
+              <a:t>11/18/2025</a:t>
             </a:fld>
             <a:endParaRPr lang="en-US"/>
           </a:p>
@@ -10103,7 +10161,7 @@
               <a:pPr>
                 <a:defRPr/>
               </a:pPr>
-              <a:t>11/17/2025</a:t>
+              <a:t>11/18/2025</a:t>
             </a:fld>
             <a:endParaRPr lang="en-US"/>
           </a:p>
@@ -10336,7 +10394,7 @@
               <a:pPr>
                 <a:defRPr/>
               </a:pPr>
-              <a:t>11/17/2025</a:t>
+              <a:t>11/18/2025</a:t>
             </a:fld>
             <a:endParaRPr lang="en-US"/>
           </a:p>
@@ -11015,7 +11073,7 @@
               <a:pPr>
                 <a:defRPr/>
               </a:pPr>
-              <a:t>11/17/2025</a:t>
+              <a:t>11/18/2025</a:t>
             </a:fld>
             <a:endParaRPr lang="en-US"/>
           </a:p>
@@ -11996,7 +12054,7 @@
           <a:p>
             <a:r>
               <a:rPr lang="en-US" dirty="0"/>
-              <a:t>Contribute with Issues</a:t>
+              <a:t>Issues &amp; Feedback</a:t>
             </a:r>
           </a:p>
         </p:txBody>
@@ -12019,8 +12077,8 @@
         </p:nvSpPr>
         <p:spPr>
           <a:xfrm>
-            <a:off x="460871" y="1063229"/>
-            <a:ext cx="4038600" cy="2545556"/>
+            <a:off x="460870" y="1203597"/>
+            <a:ext cx="4255145" cy="3384377"/>
           </a:xfrm>
         </p:spPr>
         <p:txBody>
@@ -12028,41 +12086,55 @@
           <a:lstStyle/>
           <a:p>
             <a:r>
-              <a:rPr lang="en-US" dirty="0"/>
-              <a:t>GitHub Issue: Open a documentation issue</a:t>
-            </a:r>
-          </a:p>
-          <a:p>
-            <a:r>
-              <a:rPr lang="en-US" dirty="0"/>
+              <a:rPr lang="en-US" sz="2400" dirty="0"/>
+              <a:t>GitHub Issues: Open a documentation issue</a:t>
+            </a:r>
+          </a:p>
+          <a:p>
+            <a:r>
+              <a:rPr lang="en-US" sz="2400" dirty="0"/>
               <a:t>github.com/</a:t>
             </a:r>
             <a:r>
-              <a:rPr lang="en-US" dirty="0" err="1"/>
+              <a:rPr lang="en-US" sz="2400" dirty="0" err="1"/>
               <a:t>MicrosoftDocs</a:t>
             </a:r>
-            <a:endParaRPr lang="en-US" dirty="0"/>
-          </a:p>
-          <a:p>
-            <a:r>
-              <a:rPr lang="en-US" dirty="0"/>
+            <a:endParaRPr lang="en-US" sz="2400" dirty="0"/>
+          </a:p>
+          <a:p>
+            <a:r>
+              <a:rPr lang="en-US" sz="2400" dirty="0"/>
               <a:t>Feedback widget</a:t>
             </a:r>
           </a:p>
           <a:p>
-            <a:r>
-              <a:rPr lang="en-US" dirty="0"/>
-              <a:t>Demo time!</a:t>
+            <a:pPr lvl="1"/>
+            <a:r>
+              <a:rPr lang="en-US" sz="2000" dirty="0"/>
+              <a:t>Anonymous feedback</a:t>
+            </a:r>
+          </a:p>
+          <a:p>
+            <a:pPr lvl="1"/>
+            <a:r>
+              <a:rPr lang="en-US" sz="2000" dirty="0"/>
+              <a:t>Available everywhere on Learn</a:t>
+            </a:r>
+          </a:p>
+          <a:p>
+            <a:r>
+              <a:rPr lang="en-US" sz="2400" dirty="0"/>
+              <a:t>Demo – Submit an issue</a:t>
             </a:r>
           </a:p>
         </p:txBody>
       </p:sp>
       <p:pic>
         <p:nvPicPr>
-          <p:cNvPr id="5" name="Content Placeholder 4">
+          <p:cNvPr id="10" name="Content Placeholder 9">
             <a:extLst>
               <a:ext uri="{FF2B5EF4-FFF2-40B4-BE49-F238E27FC236}">
-                <a16:creationId xmlns:a16="http://schemas.microsoft.com/office/drawing/2014/main" id="{DA814083-843F-BC86-7A2A-279232AF6403}"/>
+                <a16:creationId xmlns:a16="http://schemas.microsoft.com/office/drawing/2014/main" id="{9B8806ED-FC1E-7B04-3BDC-CADEDA21CE6D}"/>
               </a:ext>
             </a:extLst>
           </p:cNvPr>
@@ -12079,16 +12151,89 @@
             <a:fillRect/>
           </a:stretch>
         </p:blipFill>
+        <p:spPr bwMode="auto">
+          <a:xfrm>
+            <a:off x="4640932" y="2567224"/>
+            <a:ext cx="4038600" cy="1700242"/>
+          </a:xfrm>
+          <a:prstGeom prst="rect">
+            <a:avLst/>
+          </a:prstGeom>
+          <a:noFill/>
+          <a:ln w="9525">
+            <a:noFill/>
+            <a:miter lim="800000"/>
+            <a:headEnd/>
+            <a:tailEnd/>
+          </a:ln>
+        </p:spPr>
+      </p:pic>
+      <p:pic>
+        <p:nvPicPr>
+          <p:cNvPr id="12" name="Picture 11">
+            <a:extLst>
+              <a:ext uri="{FF2B5EF4-FFF2-40B4-BE49-F238E27FC236}">
+                <a16:creationId xmlns:a16="http://schemas.microsoft.com/office/drawing/2014/main" id="{18713122-810A-D54B-6A74-7B59D2DF0B3F}"/>
+              </a:ext>
+            </a:extLst>
+          </p:cNvPr>
+          <p:cNvPicPr>
+            <a:picLocks noChangeAspect="1"/>
+          </p:cNvPicPr>
+          <p:nvPr/>
+        </p:nvPicPr>
+        <p:blipFill>
+          <a:blip r:embed="rId4"/>
+          <a:stretch>
+            <a:fillRect/>
+          </a:stretch>
+        </p:blipFill>
         <p:spPr>
           <a:xfrm>
-            <a:off x="4648200" y="1579376"/>
-            <a:ext cx="4038600" cy="1187823"/>
+            <a:off x="5724128" y="1203598"/>
+            <a:ext cx="1612983" cy="920797"/>
           </a:xfrm>
           <a:prstGeom prst="rect">
             <a:avLst/>
           </a:prstGeom>
         </p:spPr>
       </p:pic>
+      <p:cxnSp>
+        <p:nvCxnSpPr>
+          <p:cNvPr id="14" name="Straight Connector 13">
+            <a:extLst>
+              <a:ext uri="{FF2B5EF4-FFF2-40B4-BE49-F238E27FC236}">
+                <a16:creationId xmlns:a16="http://schemas.microsoft.com/office/drawing/2014/main" id="{3ABF9E9E-B5DC-42DF-DC6F-522A41FBF1F3}"/>
+              </a:ext>
+            </a:extLst>
+          </p:cNvPr>
+          <p:cNvCxnSpPr/>
+          <p:nvPr/>
+        </p:nvCxnSpPr>
+        <p:spPr>
+          <a:xfrm>
+            <a:off x="4860032" y="2283718"/>
+            <a:ext cx="3600400" cy="0"/>
+          </a:xfrm>
+          <a:prstGeom prst="line">
+            <a:avLst/>
+          </a:prstGeom>
+        </p:spPr>
+        <p:style>
+          <a:lnRef idx="1">
+            <a:schemeClr val="accent1"/>
+          </a:lnRef>
+          <a:fillRef idx="0">
+            <a:schemeClr val="accent1"/>
+          </a:fillRef>
+          <a:effectRef idx="0">
+            <a:schemeClr val="accent1"/>
+          </a:effectRef>
+          <a:fontRef idx="minor">
+            <a:schemeClr val="tx1"/>
+          </a:fontRef>
+        </p:style>
+      </p:cxnSp>
     </p:spTree>
     <p:extLst>
       <p:ext uri="{BB962C8B-B14F-4D97-AF65-F5344CB8AC3E}">
@@ -12188,7 +12333,7 @@
           <a:p>
             <a:r>
               <a:rPr lang="en-US" sz="2800" dirty="0"/>
-              <a:t>Create a new PR</a:t>
+              <a:t>Create a new pull request</a:t>
             </a:r>
           </a:p>
           <a:p>
@@ -12655,25 +12800,50 @@
             <p:ph idx="1"/>
           </p:nvPr>
         </p:nvSpPr>
-        <p:spPr/>
+        <p:spPr>
+          <a:xfrm>
+            <a:off x="457200" y="1200151"/>
+            <a:ext cx="8229600" cy="3315815"/>
+          </a:xfrm>
+        </p:spPr>
         <p:txBody>
           <a:bodyPr/>
           <a:lstStyle/>
           <a:p>
             <a:r>
-              <a:rPr lang="en-US" sz="2800" dirty="0"/>
+              <a:rPr lang="en-US" sz="2400" dirty="0"/>
               <a:t>VS Code, Learn Authoring Pack, GitHub Copilot, DocuMentor, GitHub, Azure DevOps</a:t>
             </a:r>
           </a:p>
           <a:p>
             <a:r>
-              <a:rPr lang="en-US" sz="2800" dirty="0"/>
-              <a:t>Rich metadata and SEO tracking &amp; Power BI reports</a:t>
-            </a:r>
-          </a:p>
-          <a:p>
-            <a:r>
-              <a:rPr lang="en-US" sz="2800" dirty="0"/>
+              <a:rPr lang="en-US" sz="2400" dirty="0"/>
+              <a:t>Rich metadata and SEO tracking</a:t>
+            </a:r>
+          </a:p>
+          <a:p>
+            <a:r>
+              <a:rPr lang="en-US" sz="2400" dirty="0"/>
+              <a:t>Power BI reports</a:t>
+            </a:r>
+          </a:p>
+          <a:p>
+            <a:pPr lvl="1"/>
+            <a:r>
+              <a:rPr lang="en-US" sz="2000" dirty="0"/>
+              <a:t>Content health (build issues, broken links, freshness)</a:t>
+            </a:r>
+          </a:p>
+          <a:p>
+            <a:pPr lvl="1"/>
+            <a:r>
+              <a:rPr lang="en-US" sz="2000" dirty="0"/>
+              <a:t>Engagement</a:t>
+            </a:r>
+          </a:p>
+          <a:p>
+            <a:r>
+              <a:rPr lang="en-US" sz="2400" dirty="0"/>
               <a:t>Release branches for big, timed doc releases (think Build &amp; Ignite)</a:t>
             </a:r>
           </a:p>
@@ -13606,58 +13776,77 @@
             <p:ph idx="1"/>
           </p:nvPr>
         </p:nvSpPr>
-        <p:spPr/>
+        <p:spPr>
+          <a:xfrm>
+            <a:off x="457200" y="1081494"/>
+            <a:ext cx="8229600" cy="3394472"/>
+          </a:xfrm>
+        </p:spPr>
         <p:txBody>
           <a:bodyPr/>
           <a:lstStyle/>
           <a:p>
             <a:r>
-              <a:rPr lang="en-US" dirty="0"/>
+              <a:rPr lang="en-US" sz="2800" dirty="0"/>
               <a:t>Questions? Find me here this week!</a:t>
             </a:r>
           </a:p>
           <a:p>
-            <a:r>
-              <a:rPr lang="en-US" dirty="0"/>
+            <a:pPr lvl="1"/>
+            <a:r>
+              <a:rPr lang="en-US" sz="2400" dirty="0"/>
+              <a:t>Speaker corner: 2:30-3:30pm today</a:t>
+            </a:r>
+          </a:p>
+          <a:p>
+            <a:pPr lvl="1"/>
+            <a:r>
+              <a:rPr lang="en-US" sz="2400" dirty="0"/>
+              <a:t>.NET MAUI Toolkit session Thursday @ 2:30pm</a:t>
+            </a:r>
+          </a:p>
+          <a:p>
+            <a:r>
+              <a:rPr lang="en-US" sz="2800" dirty="0"/>
               <a:t>Follow up at:</a:t>
             </a:r>
           </a:p>
           <a:p>
             <a:pPr lvl="1"/>
             <a:r>
-              <a:rPr lang="en-US" dirty="0">
+              <a:rPr lang="en-US" sz="2400" dirty="0">
                 <a:hlinkClick r:id="rId3"/>
               </a:rPr>
               <a:t>alashcraft@gmail.com</a:t>
             </a:r>
-            <a:endParaRPr lang="en-US" dirty="0"/>
+            <a:endParaRPr lang="en-US" sz="2400" dirty="0"/>
           </a:p>
           <a:p>
             <a:pPr lvl="1"/>
             <a:r>
-              <a:rPr lang="en-US" dirty="0">
+              <a:rPr lang="en-US" sz="2400" dirty="0">
                 <a:hlinkClick r:id="rId4"/>
               </a:rPr>
               <a:t>https://bsky.app/profile/alvinashcraft.com</a:t>
             </a:r>
             <a:r>
-              <a:rPr lang="en-US" dirty="0"/>
+              <a:rPr lang="en-US" sz="2400" dirty="0"/>
               <a:t> </a:t>
             </a:r>
           </a:p>
           <a:p>
             <a:pPr lvl="1"/>
             <a:r>
-              <a:rPr lang="en-US" dirty="0">
+              <a:rPr lang="en-US" sz="2400" dirty="0">
                 <a:hlinkClick r:id="rId5"/>
               </a:rPr>
               <a:t>https://linkedin.com/in/alvinashcraft</a:t>
             </a:r>
-            <a:endParaRPr lang="en-US" dirty="0"/>
-          </a:p>
-          <a:p>
-            <a:r>
-              <a:rPr lang="en-US" dirty="0"/>
+            <a:endParaRPr lang="en-US" sz="2400" dirty="0"/>
+          </a:p>
+          <a:p>
+            <a:r>
+              <a:rPr lang="en-US" sz="2800" dirty="0"/>
               <a:t>Thank you!</a:t>
             </a:r>
           </a:p>
@@ -13892,8 +14081,15 @@
           <a:p>
             <a:r>
               <a:rPr lang="en-US" dirty="0"/>
-              <a:t>Morning Dew link blog: alvinashcraft.com</a:t>
-            </a:r>
+              <a:t>Morning Dew link blog: </a:t>
+            </a:r>
+            <a:r>
+              <a:rPr lang="en-US" dirty="0">
+                <a:hlinkClick r:id="rId3"/>
+              </a:rPr>
+              <a:t>alvinashcraft.com</a:t>
+            </a:r>
+            <a:endParaRPr lang="en-US" dirty="0"/>
           </a:p>
           <a:p>
             <a:r>
@@ -13917,8 +14113,14 @@
           </a:p>
           <a:p>
             <a:r>
+              <a:rPr lang="en-US" dirty="0">
+                <a:hlinkClick r:id="rId4"/>
+              </a:rPr>
+              <a:t>TechBash</a:t>
+            </a:r>
+            <a:r>
               <a:rPr lang="en-US" dirty="0"/>
-              <a:t>TechBash Dev Conference organizer since 2016</a:t>
+              <a:t> Dev Conference organizer since 2016</a:t>
             </a:r>
           </a:p>
           <a:p>
@@ -14001,8 +14203,8 @@
         </p:nvSpPr>
         <p:spPr>
           <a:xfrm>
-            <a:off x="457200" y="1200151"/>
-            <a:ext cx="8229600" cy="3027784"/>
+            <a:off x="457200" y="1200150"/>
+            <a:ext cx="8229600" cy="3315815"/>
           </a:xfrm>
         </p:spPr>
         <p:txBody>
@@ -14046,6 +14248,12 @@
             <a:r>
               <a:rPr lang="en-US" sz="2000" dirty="0"/>
               <a:t>Submit pull requests to make changes</a:t>
+            </a:r>
+          </a:p>
+          <a:p>
+            <a:r>
+              <a:rPr lang="en-US" sz="2400" dirty="0"/>
+              <a:t>How we work on Learn (time permitting)</a:t>
             </a:r>
           </a:p>
           <a:p>

</xml_diff>